<commit_message>
diagramma delle classi sulla relazione di siw
</commit_message>
<xml_diff>
--- a/Documentazione/Presentazione siw/CryptoBet.pptx
+++ b/Documentazione/Presentazione siw/CryptoBet.pptx
@@ -17,6 +17,7 @@
     <p:sldId id="265" r:id="rId11"/>
     <p:sldId id="266" r:id="rId12"/>
     <p:sldId id="267" r:id="rId13"/>
+    <p:sldId id="268" r:id="rId14"/>
   </p:sldIdLst>
   <p:sldSz cx="12192000" cy="6858000"/>
   <p:notesSz cx="6858000" cy="9144000"/>
@@ -115,7 +116,16 @@
       </a:defRPr>
     </a:lvl9pPr>
   </p:defaultTextStyle>
+  <p:extLst>
+    <p:ext uri="{EFAFB233-063F-42B5-8137-9DF3F51BA10A}">
+      <p15:sldGuideLst xmlns:p15="http://schemas.microsoft.com/office/powerpoint/2012/main"/>
+    </p:ext>
+  </p:extLst>
 </p:presentation>
+</file>
+
+<file path=ppt/revisionInfo.xml><?xml version="1.0" encoding="utf-8"?>
+<p1510:revInfo xmlns:a="http://schemas.openxmlformats.org/drawingml/2006/main" xmlns:r="http://schemas.openxmlformats.org/officeDocument/2006/relationships" xmlns:p1510="http://schemas.microsoft.com/office/powerpoint/2015/10/main"/>
 </file>
 
 <file path=ppt/slideLayouts/slideLayout1.xml><?xml version="1.0" encoding="utf-8"?>
@@ -621,7 +631,7 @@
             <a:fld id="{08B9EBBA-996F-894A-B54A-D6246ED52CEA}" type="datetimeFigureOut">
               <a:rPr lang="en-US" smtClean="0"/>
               <a:pPr/>
-              <a:t>1/19/2018</a:t>
+              <a:t>1/20/2018</a:t>
             </a:fld>
             <a:endParaRPr lang="en-US" dirty="0"/>
           </a:p>
@@ -919,7 +929,7 @@
             <a:fld id="{09B482E8-6E0E-1B4F-B1FD-C69DB9E858D9}" type="datetimeFigureOut">
               <a:rPr lang="en-US" smtClean="0"/>
               <a:pPr/>
-              <a:t>1/19/2018</a:t>
+              <a:t>1/20/2018</a:t>
             </a:fld>
             <a:endParaRPr lang="en-US" dirty="0"/>
           </a:p>
@@ -1170,7 +1180,7 @@
             <a:fld id="{09B482E8-6E0E-1B4F-B1FD-C69DB9E858D9}" type="datetimeFigureOut">
               <a:rPr lang="en-US" smtClean="0"/>
               <a:pPr/>
-              <a:t>1/19/2018</a:t>
+              <a:t>1/20/2018</a:t>
             </a:fld>
             <a:endParaRPr lang="en-US" dirty="0"/>
           </a:p>
@@ -1713,7 +1723,7 @@
             <a:fld id="{09B482E8-6E0E-1B4F-B1FD-C69DB9E858D9}" type="datetimeFigureOut">
               <a:rPr lang="en-US" smtClean="0"/>
               <a:pPr/>
-              <a:t>1/19/2018</a:t>
+              <a:t>1/20/2018</a:t>
             </a:fld>
             <a:endParaRPr lang="en-US" dirty="0"/>
           </a:p>
@@ -1964,7 +1974,7 @@
             <a:fld id="{09B482E8-6E0E-1B4F-B1FD-C69DB9E858D9}" type="datetimeFigureOut">
               <a:rPr lang="en-US" smtClean="0"/>
               <a:pPr/>
-              <a:t>1/19/2018</a:t>
+              <a:t>1/20/2018</a:t>
             </a:fld>
             <a:endParaRPr lang="en-US" dirty="0"/>
           </a:p>
@@ -2499,7 +2509,7 @@
             <a:fld id="{09B482E8-6E0E-1B4F-B1FD-C69DB9E858D9}" type="datetimeFigureOut">
               <a:rPr lang="en-US" smtClean="0"/>
               <a:pPr/>
-              <a:t>1/19/2018</a:t>
+              <a:t>1/20/2018</a:t>
             </a:fld>
             <a:endParaRPr lang="en-US" dirty="0"/>
           </a:p>
@@ -2799,7 +2809,7 @@
             <a:fld id="{09B482E8-6E0E-1B4F-B1FD-C69DB9E858D9}" type="datetimeFigureOut">
               <a:rPr lang="en-US" smtClean="0"/>
               <a:pPr/>
-              <a:t>1/19/2018</a:t>
+              <a:t>1/20/2018</a:t>
             </a:fld>
             <a:endParaRPr lang="en-US" dirty="0"/>
           </a:p>
@@ -2976,7 +2986,7 @@
             <a:fld id="{C6C52C72-DE31-F449-A4ED-4C594FD91407}" type="datetimeFigureOut">
               <a:rPr lang="en-US" smtClean="0"/>
               <a:pPr/>
-              <a:t>1/19/2018</a:t>
+              <a:t>1/20/2018</a:t>
             </a:fld>
             <a:endParaRPr lang="en-US" dirty="0"/>
           </a:p>
@@ -3158,7 +3168,7 @@
             <a:fld id="{09B482E8-6E0E-1B4F-B1FD-C69DB9E858D9}" type="datetimeFigureOut">
               <a:rPr lang="en-US" smtClean="0"/>
               <a:pPr/>
-              <a:t>1/19/2018</a:t>
+              <a:t>1/20/2018</a:t>
             </a:fld>
             <a:endParaRPr lang="en-US" dirty="0"/>
           </a:p>
@@ -3331,7 +3341,7 @@
             <a:fld id="{9B3A1323-8D79-1946-B0D7-40001CF92E9D}" type="datetimeFigureOut">
               <a:rPr lang="en-US" smtClean="0"/>
               <a:pPr/>
-              <a:t>1/19/2018</a:t>
+              <a:t>1/20/2018</a:t>
             </a:fld>
             <a:endParaRPr lang="en-US" dirty="0"/>
           </a:p>
@@ -3584,7 +3594,7 @@
             <a:fld id="{8DFA1846-DA80-1C48-A609-854EA85C59AD}" type="datetimeFigureOut">
               <a:rPr lang="en-US" smtClean="0"/>
               <a:pPr/>
-              <a:t>1/19/2018</a:t>
+              <a:t>1/20/2018</a:t>
             </a:fld>
             <a:endParaRPr lang="en-US" dirty="0"/>
           </a:p>
@@ -3883,7 +3893,7 @@
             <a:fld id="{57302355-E14B-8545-A8F8-0FE83CC9D524}" type="datetimeFigureOut">
               <a:rPr lang="en-US" smtClean="0"/>
               <a:pPr/>
-              <a:t>1/19/2018</a:t>
+              <a:t>1/20/2018</a:t>
             </a:fld>
             <a:endParaRPr lang="en-US" dirty="0"/>
           </a:p>
@@ -4332,7 +4342,7 @@
             <a:fld id="{02640F58-564D-2B4F-AE67-E407BA4FCF45}" type="datetimeFigureOut">
               <a:rPr lang="en-US" smtClean="0"/>
               <a:pPr/>
-              <a:t>1/19/2018</a:t>
+              <a:t>1/20/2018</a:t>
             </a:fld>
             <a:endParaRPr lang="en-US" dirty="0"/>
           </a:p>
@@ -4457,7 +4467,7 @@
             <a:fld id="{F13A34C8-038E-2045-AF43-DF7DBB8E0E9E}" type="datetimeFigureOut">
               <a:rPr lang="en-US" smtClean="0"/>
               <a:pPr/>
-              <a:t>1/19/2018</a:t>
+              <a:t>1/20/2018</a:t>
             </a:fld>
             <a:endParaRPr lang="en-US" dirty="0"/>
           </a:p>
@@ -4554,7 +4564,7 @@
             <a:fld id="{8818C68F-D26B-8F47-958C-23B49CF8A634}" type="datetimeFigureOut">
               <a:rPr lang="en-US" smtClean="0"/>
               <a:pPr/>
-              <a:t>1/19/2018</a:t>
+              <a:t>1/20/2018</a:t>
             </a:fld>
             <a:endParaRPr lang="en-US" dirty="0"/>
           </a:p>
@@ -4839,7 +4849,7 @@
             <a:fld id="{D0DF5E60-9974-AC48-9591-99C2BB44B7CF}" type="datetimeFigureOut">
               <a:rPr lang="en-US" smtClean="0"/>
               <a:pPr/>
-              <a:t>1/19/2018</a:t>
+              <a:t>1/20/2018</a:t>
             </a:fld>
             <a:endParaRPr lang="en-US" dirty="0"/>
           </a:p>
@@ -5137,7 +5147,7 @@
             <a:fld id="{18C79C5D-2A6F-F04D-97DA-BEF2467B64E4}" type="datetimeFigureOut">
               <a:rPr lang="en-US" smtClean="0"/>
               <a:pPr/>
-              <a:t>1/19/2018</a:t>
+              <a:t>1/20/2018</a:t>
             </a:fld>
             <a:endParaRPr lang="en-US" dirty="0"/>
           </a:p>
@@ -5669,7 +5679,7 @@
             <a:fld id="{09B482E8-6E0E-1B4F-B1FD-C69DB9E858D9}" type="datetimeFigureOut">
               <a:rPr lang="en-US" smtClean="0"/>
               <a:pPr/>
-              <a:t>1/19/2018</a:t>
+              <a:t>1/20/2018</a:t>
             </a:fld>
             <a:endParaRPr lang="en-US" dirty="0"/>
           </a:p>
@@ -6525,7 +6535,7 @@
           <a:p>
             <a:r>
               <a:rPr lang="it-IT" dirty="0"/>
-              <a:t>... altri punti di forza.</a:t>
+              <a:t>... altri punti di forza</a:t>
             </a:r>
           </a:p>
         </p:txBody>
@@ -6700,6 +6710,98 @@
 </p:sld>
 </file>
 
+<file path=ppt/slides/slide13.xml><?xml version="1.0" encoding="utf-8"?>
+<p:sld xmlns:a="http://schemas.openxmlformats.org/drawingml/2006/main" xmlns:r="http://schemas.openxmlformats.org/officeDocument/2006/relationships" xmlns:p="http://schemas.openxmlformats.org/presentationml/2006/main">
+  <p:cSld>
+    <p:spTree>
+      <p:nvGrpSpPr>
+        <p:cNvPr id="1" name=""/>
+        <p:cNvGrpSpPr/>
+        <p:nvPr/>
+      </p:nvGrpSpPr>
+      <p:grpSpPr>
+        <a:xfrm>
+          <a:off x="0" y="0"/>
+          <a:ext cx="0" cy="0"/>
+          <a:chOff x="0" y="0"/>
+          <a:chExt cx="0" cy="0"/>
+        </a:xfrm>
+      </p:grpSpPr>
+      <p:sp>
+        <p:nvSpPr>
+          <p:cNvPr id="2" name="Titolo 1">
+            <a:extLst>
+              <a:ext uri="{FF2B5EF4-FFF2-40B4-BE49-F238E27FC236}">
+                <a16:creationId xmlns:a16="http://schemas.microsoft.com/office/drawing/2014/main" id="{D17684DA-E1C8-46FD-A90B-74439BAB5F9E}"/>
+              </a:ext>
+            </a:extLst>
+          </p:cNvPr>
+          <p:cNvSpPr>
+            <a:spLocks noGrp="1"/>
+          </p:cNvSpPr>
+          <p:nvPr>
+            <p:ph type="title"/>
+          </p:nvPr>
+        </p:nvSpPr>
+        <p:spPr>
+          <a:xfrm>
+            <a:off x="1484312" y="0"/>
+            <a:ext cx="10018713" cy="1752599"/>
+          </a:xfrm>
+        </p:spPr>
+        <p:txBody>
+          <a:bodyPr/>
+          <a:lstStyle/>
+          <a:p>
+            <a:r>
+              <a:rPr lang="it-IT" dirty="0"/>
+              <a:t>5. Il diagramma delle classi.</a:t>
+            </a:r>
+          </a:p>
+        </p:txBody>
+      </p:sp>
+      <p:pic>
+        <p:nvPicPr>
+          <p:cNvPr id="5" name="Segnaposto contenuto 4">
+            <a:extLst>
+              <a:ext uri="{FF2B5EF4-FFF2-40B4-BE49-F238E27FC236}">
+                <a16:creationId xmlns:a16="http://schemas.microsoft.com/office/drawing/2014/main" id="{45060855-EEA1-4411-A607-57249A72D13A}"/>
+              </a:ext>
+            </a:extLst>
+          </p:cNvPr>
+          <p:cNvPicPr>
+            <a:picLocks noGrp="1" noChangeAspect="1"/>
+          </p:cNvPicPr>
+          <p:nvPr>
+            <p:ph idx="1"/>
+          </p:nvPr>
+        </p:nvPicPr>
+        <p:blipFill>
+          <a:blip r:embed="rId2"/>
+          <a:stretch>
+            <a:fillRect/>
+          </a:stretch>
+        </p:blipFill>
+        <p:spPr>
+          <a:xfrm>
+            <a:off x="1484312" y="1514474"/>
+            <a:ext cx="10554487" cy="4038601"/>
+          </a:xfrm>
+        </p:spPr>
+      </p:pic>
+    </p:spTree>
+    <p:extLst>
+      <p:ext uri="{BB962C8B-B14F-4D97-AF65-F5344CB8AC3E}">
+        <p14:creationId xmlns:p14="http://schemas.microsoft.com/office/powerpoint/2010/main" val="1233938496"/>
+      </p:ext>
+    </p:extLst>
+  </p:cSld>
+  <p:clrMapOvr>
+    <a:masterClrMapping/>
+  </p:clrMapOvr>
+</p:sld>
+</file>
+
 <file path=ppt/slides/slide2.xml><?xml version="1.0" encoding="utf-8"?>
 <p:sld xmlns:a="http://schemas.openxmlformats.org/drawingml/2006/main" xmlns:r="http://schemas.openxmlformats.org/officeDocument/2006/relationships" xmlns:p="http://schemas.openxmlformats.org/presentationml/2006/main">
   <p:cSld>
@@ -6833,13 +6935,13 @@
   <p:clrMapOvr>
     <a:masterClrMapping/>
   </p:clrMapOvr>
-  <mc:AlternateContent xmlns:mc="http://schemas.openxmlformats.org/markup-compatibility/2006">
-    <mc:Choice xmlns:p14="http://schemas.microsoft.com/office/powerpoint/2010/main" Requires="p14">
+  <mc:AlternateContent xmlns:mc="http://schemas.openxmlformats.org/markup-compatibility/2006" xmlns:p14="http://schemas.microsoft.com/office/powerpoint/2010/main">
+    <mc:Choice Requires="p14">
       <p:transition spd="slow" p14:dur="1500">
         <p:split orient="vert"/>
       </p:transition>
     </mc:Choice>
-    <mc:Fallback>
+    <mc:Fallback xmlns="">
       <p:transition spd="slow">
         <p:split orient="vert"/>
       </p:transition>

</xml_diff>

<commit_message>
google maps con due sedi
</commit_message>
<xml_diff>
--- a/Documentazione/Presentazione siw/CryptoBet.pptx
+++ b/Documentazione/Presentazione siw/CryptoBet.pptx
@@ -631,7 +631,7 @@
             <a:fld id="{08B9EBBA-996F-894A-B54A-D6246ED52CEA}" type="datetimeFigureOut">
               <a:rPr lang="en-US" smtClean="0"/>
               <a:pPr/>
-              <a:t>1/20/2018</a:t>
+              <a:t>1/21/2018</a:t>
             </a:fld>
             <a:endParaRPr lang="en-US" dirty="0"/>
           </a:p>
@@ -929,7 +929,7 @@
             <a:fld id="{09B482E8-6E0E-1B4F-B1FD-C69DB9E858D9}" type="datetimeFigureOut">
               <a:rPr lang="en-US" smtClean="0"/>
               <a:pPr/>
-              <a:t>1/20/2018</a:t>
+              <a:t>1/21/2018</a:t>
             </a:fld>
             <a:endParaRPr lang="en-US" dirty="0"/>
           </a:p>
@@ -1180,7 +1180,7 @@
             <a:fld id="{09B482E8-6E0E-1B4F-B1FD-C69DB9E858D9}" type="datetimeFigureOut">
               <a:rPr lang="en-US" smtClean="0"/>
               <a:pPr/>
-              <a:t>1/20/2018</a:t>
+              <a:t>1/21/2018</a:t>
             </a:fld>
             <a:endParaRPr lang="en-US" dirty="0"/>
           </a:p>
@@ -1723,7 +1723,7 @@
             <a:fld id="{09B482E8-6E0E-1B4F-B1FD-C69DB9E858D9}" type="datetimeFigureOut">
               <a:rPr lang="en-US" smtClean="0"/>
               <a:pPr/>
-              <a:t>1/20/2018</a:t>
+              <a:t>1/21/2018</a:t>
             </a:fld>
             <a:endParaRPr lang="en-US" dirty="0"/>
           </a:p>
@@ -1974,7 +1974,7 @@
             <a:fld id="{09B482E8-6E0E-1B4F-B1FD-C69DB9E858D9}" type="datetimeFigureOut">
               <a:rPr lang="en-US" smtClean="0"/>
               <a:pPr/>
-              <a:t>1/20/2018</a:t>
+              <a:t>1/21/2018</a:t>
             </a:fld>
             <a:endParaRPr lang="en-US" dirty="0"/>
           </a:p>
@@ -2509,7 +2509,7 @@
             <a:fld id="{09B482E8-6E0E-1B4F-B1FD-C69DB9E858D9}" type="datetimeFigureOut">
               <a:rPr lang="en-US" smtClean="0"/>
               <a:pPr/>
-              <a:t>1/20/2018</a:t>
+              <a:t>1/21/2018</a:t>
             </a:fld>
             <a:endParaRPr lang="en-US" dirty="0"/>
           </a:p>
@@ -2809,7 +2809,7 @@
             <a:fld id="{09B482E8-6E0E-1B4F-B1FD-C69DB9E858D9}" type="datetimeFigureOut">
               <a:rPr lang="en-US" smtClean="0"/>
               <a:pPr/>
-              <a:t>1/20/2018</a:t>
+              <a:t>1/21/2018</a:t>
             </a:fld>
             <a:endParaRPr lang="en-US" dirty="0"/>
           </a:p>
@@ -2986,7 +2986,7 @@
             <a:fld id="{C6C52C72-DE31-F449-A4ED-4C594FD91407}" type="datetimeFigureOut">
               <a:rPr lang="en-US" smtClean="0"/>
               <a:pPr/>
-              <a:t>1/20/2018</a:t>
+              <a:t>1/21/2018</a:t>
             </a:fld>
             <a:endParaRPr lang="en-US" dirty="0"/>
           </a:p>
@@ -3168,7 +3168,7 @@
             <a:fld id="{09B482E8-6E0E-1B4F-B1FD-C69DB9E858D9}" type="datetimeFigureOut">
               <a:rPr lang="en-US" smtClean="0"/>
               <a:pPr/>
-              <a:t>1/20/2018</a:t>
+              <a:t>1/21/2018</a:t>
             </a:fld>
             <a:endParaRPr lang="en-US" dirty="0"/>
           </a:p>
@@ -3341,7 +3341,7 @@
             <a:fld id="{9B3A1323-8D79-1946-B0D7-40001CF92E9D}" type="datetimeFigureOut">
               <a:rPr lang="en-US" smtClean="0"/>
               <a:pPr/>
-              <a:t>1/20/2018</a:t>
+              <a:t>1/21/2018</a:t>
             </a:fld>
             <a:endParaRPr lang="en-US" dirty="0"/>
           </a:p>
@@ -3594,7 +3594,7 @@
             <a:fld id="{8DFA1846-DA80-1C48-A609-854EA85C59AD}" type="datetimeFigureOut">
               <a:rPr lang="en-US" smtClean="0"/>
               <a:pPr/>
-              <a:t>1/20/2018</a:t>
+              <a:t>1/21/2018</a:t>
             </a:fld>
             <a:endParaRPr lang="en-US" dirty="0"/>
           </a:p>
@@ -3893,7 +3893,7 @@
             <a:fld id="{57302355-E14B-8545-A8F8-0FE83CC9D524}" type="datetimeFigureOut">
               <a:rPr lang="en-US" smtClean="0"/>
               <a:pPr/>
-              <a:t>1/20/2018</a:t>
+              <a:t>1/21/2018</a:t>
             </a:fld>
             <a:endParaRPr lang="en-US" dirty="0"/>
           </a:p>
@@ -4342,7 +4342,7 @@
             <a:fld id="{02640F58-564D-2B4F-AE67-E407BA4FCF45}" type="datetimeFigureOut">
               <a:rPr lang="en-US" smtClean="0"/>
               <a:pPr/>
-              <a:t>1/20/2018</a:t>
+              <a:t>1/21/2018</a:t>
             </a:fld>
             <a:endParaRPr lang="en-US" dirty="0"/>
           </a:p>
@@ -4467,7 +4467,7 @@
             <a:fld id="{F13A34C8-038E-2045-AF43-DF7DBB8E0E9E}" type="datetimeFigureOut">
               <a:rPr lang="en-US" smtClean="0"/>
               <a:pPr/>
-              <a:t>1/20/2018</a:t>
+              <a:t>1/21/2018</a:t>
             </a:fld>
             <a:endParaRPr lang="en-US" dirty="0"/>
           </a:p>
@@ -4564,7 +4564,7 @@
             <a:fld id="{8818C68F-D26B-8F47-958C-23B49CF8A634}" type="datetimeFigureOut">
               <a:rPr lang="en-US" smtClean="0"/>
               <a:pPr/>
-              <a:t>1/20/2018</a:t>
+              <a:t>1/21/2018</a:t>
             </a:fld>
             <a:endParaRPr lang="en-US" dirty="0"/>
           </a:p>
@@ -4849,7 +4849,7 @@
             <a:fld id="{D0DF5E60-9974-AC48-9591-99C2BB44B7CF}" type="datetimeFigureOut">
               <a:rPr lang="en-US" smtClean="0"/>
               <a:pPr/>
-              <a:t>1/20/2018</a:t>
+              <a:t>1/21/2018</a:t>
             </a:fld>
             <a:endParaRPr lang="en-US" dirty="0"/>
           </a:p>
@@ -5147,7 +5147,7 @@
             <a:fld id="{18C79C5D-2A6F-F04D-97DA-BEF2467B64E4}" type="datetimeFigureOut">
               <a:rPr lang="en-US" smtClean="0"/>
               <a:pPr/>
-              <a:t>1/20/2018</a:t>
+              <a:t>1/21/2018</a:t>
             </a:fld>
             <a:endParaRPr lang="en-US" dirty="0"/>
           </a:p>
@@ -5679,7 +5679,7 @@
             <a:fld id="{09B482E8-6E0E-1B4F-B1FD-C69DB9E858D9}" type="datetimeFigureOut">
               <a:rPr lang="en-US" smtClean="0"/>
               <a:pPr/>
-              <a:t>1/20/2018</a:t>
+              <a:t>1/21/2018</a:t>
             </a:fld>
             <a:endParaRPr lang="en-US" dirty="0"/>
           </a:p>
@@ -6556,7 +6556,12 @@
             <p:ph idx="1"/>
           </p:nvPr>
         </p:nvSpPr>
-        <p:spPr/>
+        <p:spPr>
+          <a:xfrm>
+            <a:off x="1484311" y="2188535"/>
+            <a:ext cx="10018713" cy="4020879"/>
+          </a:xfrm>
+        </p:spPr>
         <p:txBody>
           <a:bodyPr>
             <a:normAutofit fontScale="92500" lnSpcReduction="10000"/>
@@ -6564,40 +6569,54 @@
           <a:lstStyle/>
           <a:p>
             <a:r>
-              <a:rPr lang="it-IT" dirty="0"/>
+              <a:rPr lang="it-IT" sz="2200" dirty="0"/>
               <a:t>L’amministratore, nel modificare una quota, può richiede al sistema un suggerimento. Sulla base di statistiche implementate manualmente ed effettuate sulle </a:t>
             </a:r>
             <a:r>
-              <a:rPr lang="it-IT" dirty="0" err="1"/>
+              <a:rPr lang="it-IT" sz="2200" dirty="0" err="1"/>
               <a:t>tuple</a:t>
             </a:r>
             <a:r>
-              <a:rPr lang="it-IT" dirty="0"/>
+              <a:rPr lang="it-IT" sz="2200" dirty="0"/>
               <a:t> del database, il sistema è in grado di fornire il supporto richiesto. </a:t>
             </a:r>
           </a:p>
           <a:p>
             <a:r>
-              <a:rPr lang="it-IT" dirty="0"/>
+              <a:rPr lang="it-IT" sz="2200" dirty="0"/>
               <a:t>Il dominio rappresentato da </a:t>
             </a:r>
             <a:r>
-              <a:rPr lang="it-IT" dirty="0" err="1"/>
+              <a:rPr lang="it-IT" sz="2200" dirty="0" err="1"/>
               <a:t>CryptoBet</a:t>
             </a:r>
             <a:r>
-              <a:rPr lang="it-IT" dirty="0"/>
+              <a:rPr lang="it-IT" sz="2200" dirty="0"/>
               <a:t> è non banale. Ciò è dimostrato dal fatto che il database è dotato di ben 14 tabelle.</a:t>
             </a:r>
           </a:p>
           <a:p>
             <a:r>
-              <a:rPr lang="it-IT" dirty="0" err="1"/>
+              <a:rPr lang="it-IT" sz="2200" dirty="0" err="1"/>
               <a:t>CryptoBet</a:t>
             </a:r>
             <a:r>
-              <a:rPr lang="it-IT" dirty="0"/>
+              <a:rPr lang="it-IT" sz="2200" dirty="0"/>
               <a:t> fornisce agli utilizzatori tutte le funzionalità che garantisce un tipico sito di scommesse. Tutti i casi d’uso che erano stati pianificati sono stati implementati e nessuna funzionalità è stata tralasciata.</a:t>
+            </a:r>
+          </a:p>
+          <a:p>
+            <a:r>
+              <a:rPr lang="it-IT" sz="2200" dirty="0"/>
+              <a:t>Si noti anche l’uso, seppur di secondaria importanza, di un’altra API: Google Maps. Tramite una mappa, inserita nella pagina relativa alle informazioni varie, il cliente può inserire il suo luogo di partenza e visualizzare il percorso minimo per raggiungere il più vicino dei nostri </a:t>
+            </a:r>
+            <a:r>
+              <a:rPr lang="it-IT" sz="2200"/>
+              <a:t>‘ipotetici’ negozi </a:t>
+            </a:r>
+            <a:r>
+              <a:rPr lang="it-IT" sz="2200" dirty="0"/>
+              <a:t>scommesse.</a:t>
             </a:r>
           </a:p>
           <a:p>
@@ -7416,7 +7435,7 @@
             </a:r>
             <a:r>
               <a:rPr lang="it-IT" sz="2000" dirty="0"/>
-              <a:t> consente di creare un account personale associando a quest’ultimo una carta di credito che verrà utilizzata per versare e/o prelevare denaro dal conto. Una volta in possesso dell’account, il giocatore può finalmente accedere al sito tramite le credenziali da lui inserite al momento della registrazione. </a:t>
+              <a:t> consente di creare un account personale associando a quest’ultimo una carta di credito che verrà utilizzata per versare e/o prelevare denaro dal conto. Una volta in possesso dell’account, il giocatore può finalmente accedere al sito tramite le credenziali da lui inserite nel momento della registrazione. </a:t>
             </a:r>
             <a:br>
               <a:rPr lang="it-IT" sz="2000" dirty="0"/>

</xml_diff>